<commit_message>
Add main script with necessary imports and preprocessing
</commit_message>
<xml_diff>
--- a/presentation_nlp.pptx
+++ b/presentation_nlp.pptx
@@ -5,7 +5,7 @@
     <p:sldMasterId id="2147483659" r:id="rId1"/>
   </p:sldMasterIdLst>
   <p:notesMasterIdLst>
-    <p:notesMasterId r:id="rId11"/>
+    <p:notesMasterId r:id="rId12"/>
   </p:notesMasterIdLst>
   <p:sldIdLst>
     <p:sldId id="256" r:id="rId2"/>
@@ -16,33 +16,34 @@
     <p:sldId id="263" r:id="rId7"/>
     <p:sldId id="264" r:id="rId8"/>
     <p:sldId id="265" r:id="rId9"/>
-    <p:sldId id="266" r:id="rId10"/>
+    <p:sldId id="267" r:id="rId10"/>
+    <p:sldId id="266" r:id="rId11"/>
   </p:sldIdLst>
   <p:sldSz cx="9144000" cy="5143500" type="screen16x9"/>
   <p:notesSz cx="6858000" cy="9144000"/>
   <p:embeddedFontLst>
     <p:embeddedFont>
       <p:font typeface="Average" panose="020B0604020202020204" charset="0"/>
-      <p:regular r:id="rId12"/>
+      <p:regular r:id="rId13"/>
     </p:embeddedFont>
     <p:embeddedFont>
       <p:font typeface="Lato" panose="020F0502020204030203" pitchFamily="34" charset="0"/>
-      <p:regular r:id="rId13"/>
-      <p:bold r:id="rId14"/>
-      <p:italic r:id="rId15"/>
-      <p:boldItalic r:id="rId16"/>
+      <p:regular r:id="rId14"/>
+      <p:bold r:id="rId15"/>
+      <p:italic r:id="rId16"/>
+      <p:boldItalic r:id="rId17"/>
     </p:embeddedFont>
     <p:embeddedFont>
       <p:font typeface="Maven Pro" panose="020B0604020202020204" charset="0"/>
-      <p:regular r:id="rId17"/>
-      <p:bold r:id="rId18"/>
+      <p:regular r:id="rId18"/>
+      <p:bold r:id="rId19"/>
     </p:embeddedFont>
     <p:embeddedFont>
-      <p:font typeface="Nunito" panose="00000500000000000000" pitchFamily="2" charset="0"/>
-      <p:regular r:id="rId19"/>
-      <p:bold r:id="rId20"/>
-      <p:italic r:id="rId21"/>
-      <p:boldItalic r:id="rId22"/>
+      <p:font typeface="Nunito" pitchFamily="2" charset="0"/>
+      <p:regular r:id="rId20"/>
+      <p:bold r:id="rId21"/>
+      <p:italic r:id="rId22"/>
+      <p:boldItalic r:id="rId23"/>
     </p:embeddedFont>
   </p:embeddedFontLst>
   <p:defaultTextStyle>
@@ -838,6 +839,110 @@
 </p:notes>
 </file>
 
+<file path=ppt/notesSlides/notesSlide10.xml><?xml version="1.0" encoding="utf-8"?>
+<p:notes xmlns:a="http://schemas.openxmlformats.org/drawingml/2006/main" xmlns:r="http://schemas.openxmlformats.org/officeDocument/2006/relationships" xmlns:p="http://schemas.openxmlformats.org/presentationml/2006/main" showMasterSp="0" showMasterPhAnim="0">
+  <p:cSld>
+    <p:spTree>
+      <p:nvGrpSpPr>
+        <p:cNvPr id="1" name="Shape 338"/>
+        <p:cNvGrpSpPr/>
+        <p:nvPr/>
+      </p:nvGrpSpPr>
+      <p:grpSpPr>
+        <a:xfrm>
+          <a:off x="0" y="0"/>
+          <a:ext cx="0" cy="0"/>
+          <a:chOff x="0" y="0"/>
+          <a:chExt cx="0" cy="0"/>
+        </a:xfrm>
+      </p:grpSpPr>
+      <p:sp>
+        <p:nvSpPr>
+          <p:cNvPr id="339" name="Google Shape;339;g2e4faba0137_0_852:notes"/>
+          <p:cNvSpPr>
+            <a:spLocks noGrp="1" noRot="1" noChangeAspect="1"/>
+          </p:cNvSpPr>
+          <p:nvPr>
+            <p:ph type="sldImg" idx="2"/>
+          </p:nvPr>
+        </p:nvSpPr>
+        <p:spPr>
+          <a:xfrm>
+            <a:off x="381300" y="685800"/>
+            <a:ext cx="6096000" cy="3429000"/>
+          </a:xfrm>
+          <a:custGeom>
+            <a:avLst/>
+            <a:gdLst/>
+            <a:ahLst/>
+            <a:cxnLst/>
+            <a:rect l="l" t="t" r="r" b="b"/>
+            <a:pathLst>
+              <a:path w="120000" h="120000" extrusionOk="0">
+                <a:moveTo>
+                  <a:pt x="0" y="0"/>
+                </a:moveTo>
+                <a:lnTo>
+                  <a:pt x="120000" y="0"/>
+                </a:lnTo>
+                <a:lnTo>
+                  <a:pt x="120000" y="120000"/>
+                </a:lnTo>
+                <a:lnTo>
+                  <a:pt x="0" y="120000"/>
+                </a:lnTo>
+                <a:close/>
+              </a:path>
+            </a:pathLst>
+          </a:custGeom>
+        </p:spPr>
+      </p:sp>
+      <p:sp>
+        <p:nvSpPr>
+          <p:cNvPr id="340" name="Google Shape;340;g2e4faba0137_0_852:notes"/>
+          <p:cNvSpPr txBox="1">
+            <a:spLocks noGrp="1"/>
+          </p:cNvSpPr>
+          <p:nvPr>
+            <p:ph type="body" idx="1"/>
+          </p:nvPr>
+        </p:nvSpPr>
+        <p:spPr>
+          <a:xfrm>
+            <a:off x="685800" y="4343400"/>
+            <a:ext cx="5486400" cy="4114800"/>
+          </a:xfrm>
+          <a:prstGeom prst="rect">
+            <a:avLst/>
+          </a:prstGeom>
+        </p:spPr>
+        <p:txBody>
+          <a:bodyPr spcFirstLastPara="1" wrap="square" lIns="91425" tIns="91425" rIns="91425" bIns="91425" anchor="t" anchorCtr="0">
+            <a:noAutofit/>
+          </a:bodyPr>
+          <a:lstStyle/>
+          <a:p>
+            <a:pPr marL="0" lvl="0" indent="0" algn="l" rtl="0">
+              <a:spcBef>
+                <a:spcPts val="0"/>
+              </a:spcBef>
+              <a:spcAft>
+                <a:spcPts val="0"/>
+              </a:spcAft>
+              <a:buNone/>
+            </a:pPr>
+            <a:endParaRPr/>
+          </a:p>
+        </p:txBody>
+      </p:sp>
+    </p:spTree>
+  </p:cSld>
+  <p:clrMapOvr>
+    <a:masterClrMapping/>
+  </p:clrMapOvr>
+</p:notes>
+</file>
+
 <file path=ppt/notesSlides/notesSlide2.xml><?xml version="1.0" encoding="utf-8"?>
 <p:notes xmlns:a="http://schemas.openxmlformats.org/drawingml/2006/main" xmlns:r="http://schemas.openxmlformats.org/officeDocument/2006/relationships" xmlns:p="http://schemas.openxmlformats.org/presentationml/2006/main" showMasterSp="0" showMasterPhAnim="0">
   <p:cSld>
@@ -1571,7 +1676,7 @@
   <p:cSld>
     <p:spTree>
       <p:nvGrpSpPr>
-        <p:cNvPr id="1" name="Shape 338"/>
+        <p:cNvPr id="1" name="Shape 332"/>
         <p:cNvGrpSpPr/>
         <p:nvPr/>
       </p:nvGrpSpPr>
@@ -1585,7 +1690,7 @@
       </p:grpSpPr>
       <p:sp>
         <p:nvSpPr>
-          <p:cNvPr id="339" name="Google Shape;339;g2e4faba0137_0_852:notes"/>
+          <p:cNvPr id="333" name="Google Shape;333;g2e4faba0137_0_908:notes"/>
           <p:cNvSpPr>
             <a:spLocks noGrp="1" noRot="1" noChangeAspect="1"/>
           </p:cNvSpPr>
@@ -1595,7 +1700,7 @@
         </p:nvSpPr>
         <p:spPr>
           <a:xfrm>
-            <a:off x="381300" y="685800"/>
+            <a:off x="381000" y="685800"/>
             <a:ext cx="6096000" cy="3429000"/>
           </a:xfrm>
           <a:custGeom>
@@ -1626,7 +1731,7 @@
       </p:sp>
       <p:sp>
         <p:nvSpPr>
-          <p:cNvPr id="340" name="Google Shape;340;g2e4faba0137_0_852:notes"/>
+          <p:cNvPr id="334" name="Google Shape;334;g2e4faba0137_0_908:notes"/>
           <p:cNvSpPr txBox="1">
             <a:spLocks noGrp="1"/>
           </p:cNvSpPr>
@@ -1663,6 +1768,11 @@
         </p:txBody>
       </p:sp>
     </p:spTree>
+    <p:extLst>
+      <p:ext uri="{BB962C8B-B14F-4D97-AF65-F5344CB8AC3E}">
+        <p14:creationId xmlns:p14="http://schemas.microsoft.com/office/powerpoint/2010/main" val="2636271635"/>
+      </p:ext>
+    </p:extLst>
   </p:cSld>
   <p:clrMapOvr>
     <a:masterClrMapping/>
@@ -3569,7 +3679,7 @@
             </a:pPr>
             <a:fld id="{00000000-1234-1234-1234-123412341234}" type="slidenum">
               <a:rPr lang="fr"/>
-              <a:t>‹N°›</a:t>
+              <a:t>‹#›</a:t>
             </a:fld>
             <a:endParaRPr/>
           </a:p>
@@ -8993,7 +9103,7 @@
             </a:pPr>
             <a:fld id="{00000000-1234-1234-1234-123412341234}" type="slidenum">
               <a:rPr lang="fr"/>
-              <a:t>‹N°›</a:t>
+              <a:t>‹#›</a:t>
             </a:fld>
             <a:endParaRPr/>
           </a:p>
@@ -9097,7 +9207,7 @@
             </a:pPr>
             <a:fld id="{00000000-1234-1234-1234-123412341234}" type="slidenum">
               <a:rPr lang="fr"/>
-              <a:t>‹N°›</a:t>
+              <a:t>‹#›</a:t>
             </a:fld>
             <a:endParaRPr/>
           </a:p>
@@ -10607,7 +10717,7 @@
             </a:pPr>
             <a:fld id="{00000000-1234-1234-1234-123412341234}" type="slidenum">
               <a:rPr lang="fr"/>
-              <a:t>‹N°›</a:t>
+              <a:t>‹#›</a:t>
             </a:fld>
             <a:endParaRPr/>
           </a:p>
@@ -11074,7 +11184,7 @@
             </a:pPr>
             <a:fld id="{00000000-1234-1234-1234-123412341234}" type="slidenum">
               <a:rPr lang="fr"/>
-              <a:t>‹N°›</a:t>
+              <a:t>‹#›</a:t>
             </a:fld>
             <a:endParaRPr/>
           </a:p>
@@ -11670,7 +11780,7 @@
             </a:pPr>
             <a:fld id="{00000000-1234-1234-1234-123412341234}" type="slidenum">
               <a:rPr lang="fr"/>
-              <a:t>‹N°›</a:t>
+              <a:t>‹#›</a:t>
             </a:fld>
             <a:endParaRPr/>
           </a:p>
@@ -12008,7 +12118,7 @@
             </a:pPr>
             <a:fld id="{00000000-1234-1234-1234-123412341234}" type="slidenum">
               <a:rPr lang="fr"/>
-              <a:t>‹N°›</a:t>
+              <a:t>‹#›</a:t>
             </a:fld>
             <a:endParaRPr/>
           </a:p>
@@ -12475,7 +12585,7 @@
             </a:pPr>
             <a:fld id="{00000000-1234-1234-1234-123412341234}" type="slidenum">
               <a:rPr lang="fr"/>
-              <a:t>‹N°›</a:t>
+              <a:t>‹#›</a:t>
             </a:fld>
             <a:endParaRPr/>
           </a:p>
@@ -13220,7 +13330,7 @@
             </a:pPr>
             <a:fld id="{00000000-1234-1234-1234-123412341234}" type="slidenum">
               <a:rPr lang="fr"/>
-              <a:t>‹N°›</a:t>
+              <a:t>‹#›</a:t>
             </a:fld>
             <a:endParaRPr/>
           </a:p>
@@ -13870,7 +13980,7 @@
             </a:pPr>
             <a:fld id="{00000000-1234-1234-1234-123412341234}" type="slidenum">
               <a:rPr lang="fr"/>
-              <a:t>‹N°›</a:t>
+              <a:t>‹#›</a:t>
             </a:fld>
             <a:endParaRPr/>
           </a:p>
@@ -14123,7 +14233,7 @@
             </a:pPr>
             <a:fld id="{00000000-1234-1234-1234-123412341234}" type="slidenum">
               <a:rPr lang="fr"/>
-              <a:t>‹N°›</a:t>
+              <a:t>‹#›</a:t>
             </a:fld>
             <a:endParaRPr/>
           </a:p>
@@ -14820,7 +14930,7 @@
             </a:pPr>
             <a:fld id="{00000000-1234-1234-1234-123412341234}" type="slidenum">
               <a:rPr lang="fr"/>
-              <a:t>‹N°›</a:t>
+              <a:t>‹#›</a:t>
             </a:fld>
             <a:endParaRPr/>
           </a:p>
@@ -16027,6 +16137,162 @@
 </p:sld>
 </file>
 
+<file path=ppt/slides/slide10.xml><?xml version="1.0" encoding="utf-8"?>
+<p:sld xmlns:a="http://schemas.openxmlformats.org/drawingml/2006/main" xmlns:r="http://schemas.openxmlformats.org/officeDocument/2006/relationships" xmlns:p="http://schemas.openxmlformats.org/presentationml/2006/main">
+  <p:cSld>
+    <p:spTree>
+      <p:nvGrpSpPr>
+        <p:cNvPr id="1" name="Shape 341"/>
+        <p:cNvGrpSpPr/>
+        <p:nvPr/>
+      </p:nvGrpSpPr>
+      <p:grpSpPr>
+        <a:xfrm>
+          <a:off x="0" y="0"/>
+          <a:ext cx="0" cy="0"/>
+          <a:chOff x="0" y="0"/>
+          <a:chExt cx="0" cy="0"/>
+        </a:xfrm>
+      </p:grpSpPr>
+      <p:sp>
+        <p:nvSpPr>
+          <p:cNvPr id="342" name="Google Shape;342;p23"/>
+          <p:cNvSpPr txBox="1">
+            <a:spLocks noGrp="1"/>
+          </p:cNvSpPr>
+          <p:nvPr>
+            <p:ph type="ctrTitle"/>
+          </p:nvPr>
+        </p:nvSpPr>
+        <p:spPr>
+          <a:xfrm>
+            <a:off x="201075" y="1258975"/>
+            <a:ext cx="8844000" cy="3058800"/>
+          </a:xfrm>
+          <a:prstGeom prst="rect">
+            <a:avLst/>
+          </a:prstGeom>
+        </p:spPr>
+        <p:txBody>
+          <a:bodyPr spcFirstLastPara="1" wrap="square" lIns="91425" tIns="91425" rIns="91425" bIns="91425" anchor="ctr" anchorCtr="0">
+            <a:noAutofit/>
+          </a:bodyPr>
+          <a:lstStyle/>
+          <a:p>
+            <a:pPr marL="0" lvl="0" indent="0" algn="l" rtl="0">
+              <a:lnSpc>
+                <a:spcPct val="115000"/>
+              </a:lnSpc>
+              <a:spcBef>
+                <a:spcPts val="1200"/>
+              </a:spcBef>
+              <a:spcAft>
+                <a:spcPts val="0"/>
+              </a:spcAft>
+              <a:buSzPts val="990"/>
+              <a:buNone/>
+            </a:pPr>
+            <a:r>
+              <a:rPr lang="fr" sz="1800" b="0">
+                <a:solidFill>
+                  <a:srgbClr val="000000"/>
+                </a:solidFill>
+                <a:latin typeface="Average"/>
+                <a:ea typeface="Average"/>
+                <a:cs typeface="Average"/>
+                <a:sym typeface="Average"/>
+              </a:rPr>
+              <a:t>À travers cette étude, nous avons comparé différentes techniques de vectorisation pour mesurer la similarité entre des documents et des mots clés. Le Bag of Words et le TF-IDF, bien que simples, montrent leurs limites face à Word2Vec et BERT embeddings, plus avancés et contextuels. L'application Streamlit développée permet une exploration interactive des résultats, facilitant le choix de la méthode de vectorisation la plus adaptée. En conclusion, la vectorisation est cruciale pour traiter et analyser de grandes quantités de données textuelles, et l'évaluation de ces méthodes permet d'optimiser la recherche d'informations et l'analyse de contenu.</a:t>
+            </a:r>
+            <a:endParaRPr sz="1800" b="0">
+              <a:solidFill>
+                <a:srgbClr val="000000"/>
+              </a:solidFill>
+              <a:latin typeface="Average"/>
+              <a:ea typeface="Average"/>
+              <a:cs typeface="Average"/>
+              <a:sym typeface="Average"/>
+            </a:endParaRPr>
+          </a:p>
+          <a:p>
+            <a:pPr marL="0" lvl="0" indent="0" algn="l" rtl="0">
+              <a:spcBef>
+                <a:spcPts val="1200"/>
+              </a:spcBef>
+              <a:spcAft>
+                <a:spcPts val="0"/>
+              </a:spcAft>
+              <a:buSzPts val="990"/>
+              <a:buNone/>
+            </a:pPr>
+            <a:endParaRPr sz="1440">
+              <a:solidFill>
+                <a:srgbClr val="000000"/>
+              </a:solidFill>
+            </a:endParaRPr>
+          </a:p>
+        </p:txBody>
+      </p:sp>
+      <p:sp>
+        <p:nvSpPr>
+          <p:cNvPr id="343" name="Google Shape;343;p23"/>
+          <p:cNvSpPr txBox="1">
+            <a:spLocks noGrp="1"/>
+          </p:cNvSpPr>
+          <p:nvPr>
+            <p:ph type="subTitle" idx="1"/>
+          </p:nvPr>
+        </p:nvSpPr>
+        <p:spPr>
+          <a:xfrm>
+            <a:off x="3147850" y="363500"/>
+            <a:ext cx="3191100" cy="695400"/>
+          </a:xfrm>
+          <a:prstGeom prst="rect">
+            <a:avLst/>
+          </a:prstGeom>
+        </p:spPr>
+        <p:txBody>
+          <a:bodyPr spcFirstLastPara="1" wrap="square" lIns="91425" tIns="91425" rIns="91425" bIns="91425" anchor="t" anchorCtr="0">
+            <a:noAutofit/>
+          </a:bodyPr>
+          <a:lstStyle/>
+          <a:p>
+            <a:pPr marL="0" lvl="0" indent="0" algn="l" rtl="0">
+              <a:spcBef>
+                <a:spcPts val="0"/>
+              </a:spcBef>
+              <a:spcAft>
+                <a:spcPts val="0"/>
+              </a:spcAft>
+              <a:buNone/>
+            </a:pPr>
+            <a:r>
+              <a:rPr lang="fr" sz="2400">
+                <a:latin typeface="Average"/>
+                <a:ea typeface="Average"/>
+                <a:cs typeface="Average"/>
+                <a:sym typeface="Average"/>
+              </a:rPr>
+              <a:t>CONCLUSION</a:t>
+            </a:r>
+            <a:endParaRPr sz="2400">
+              <a:latin typeface="Average"/>
+              <a:ea typeface="Average"/>
+              <a:cs typeface="Average"/>
+              <a:sym typeface="Average"/>
+            </a:endParaRPr>
+          </a:p>
+        </p:txBody>
+      </p:sp>
+    </p:spTree>
+  </p:cSld>
+  <p:clrMapOvr>
+    <a:masterClrMapping/>
+  </p:clrMapOvr>
+</p:sld>
+</file>
+
 <file path=ppt/slides/slide2.xml><?xml version="1.0" encoding="utf-8"?>
 <p:sld xmlns:a="http://schemas.openxmlformats.org/drawingml/2006/main" xmlns:r="http://schemas.openxmlformats.org/officeDocument/2006/relationships" xmlns:p="http://schemas.openxmlformats.org/presentationml/2006/main">
   <p:cSld>
@@ -18660,7 +18926,7 @@
   <p:cSld>
     <p:spTree>
       <p:nvGrpSpPr>
-        <p:cNvPr id="1" name="Shape 341"/>
+        <p:cNvPr id="1" name="Shape 335"/>
         <p:cNvGrpSpPr/>
         <p:nvPr/>
       </p:nvGrpSpPr>
@@ -18674,7 +18940,7 @@
       </p:grpSpPr>
       <p:sp>
         <p:nvSpPr>
-          <p:cNvPr id="342" name="Google Shape;342;p23"/>
+          <p:cNvPr id="336" name="Google Shape;336;p22"/>
           <p:cNvSpPr txBox="1">
             <a:spLocks noGrp="1"/>
           </p:cNvSpPr>
@@ -18684,8 +18950,8 @@
         </p:nvSpPr>
         <p:spPr>
           <a:xfrm>
-            <a:off x="201075" y="1258975"/>
-            <a:ext cx="8844000" cy="3058800"/>
+            <a:off x="750600" y="62575"/>
+            <a:ext cx="7642800" cy="661200"/>
           </a:xfrm>
           <a:prstGeom prst="rect">
             <a:avLst/>
@@ -18697,45 +18963,38 @@
           </a:bodyPr>
           <a:lstStyle/>
           <a:p>
-            <a:pPr marL="0" lvl="0" indent="0" algn="l" rtl="0">
-              <a:lnSpc>
-                <a:spcPct val="115000"/>
-              </a:lnSpc>
-              <a:spcBef>
-                <a:spcPts val="1200"/>
-              </a:spcBef>
-              <a:spcAft>
-                <a:spcPts val="0"/>
-              </a:spcAft>
-              <a:buSzPts val="990"/>
+            <a:pPr marL="457200" lvl="0" indent="0" algn="l" rtl="0">
+              <a:spcBef>
+                <a:spcPts val="0"/>
+              </a:spcBef>
+              <a:spcAft>
+                <a:spcPts val="0"/>
+              </a:spcAft>
               <a:buNone/>
             </a:pPr>
             <a:r>
-              <a:rPr lang="fr" sz="1800" b="0">
-                <a:solidFill>
-                  <a:srgbClr val="000000"/>
-                </a:solidFill>
-                <a:latin typeface="Average"/>
-                <a:ea typeface="Average"/>
-                <a:cs typeface="Average"/>
-                <a:sym typeface="Average"/>
+              <a:rPr lang="fr" sz="3000" b="0" dirty="0">
+                <a:latin typeface="Lato"/>
+                <a:ea typeface="Lato"/>
+                <a:cs typeface="Lato"/>
+                <a:sym typeface="Lato"/>
               </a:rPr>
-              <a:t>À travers cette étude, nous avons comparé différentes techniques de vectorisation pour mesurer la similarité entre des documents et des mots clés. Le Bag of Words et le TF-IDF, bien que simples, montrent leurs limites face à Word2Vec et BERT embeddings, plus avancés et contextuels. L'application Streamlit développée permet une exploration interactive des résultats, facilitant le choix de la méthode de vectorisation la plus adaptée. En conclusion, la vectorisation est cruciale pour traiter et analyser de grandes quantités de données textuelles, et l'évaluation de ces méthodes permet d'optimiser la recherche d'informations et l'analyse de contenu.</a:t>
+              <a:t>VII – Interface Streamlit</a:t>
             </a:r>
-            <a:endParaRPr sz="1800" b="0">
-              <a:solidFill>
-                <a:srgbClr val="000000"/>
-              </a:solidFill>
-              <a:latin typeface="Average"/>
-              <a:ea typeface="Average"/>
-              <a:cs typeface="Average"/>
-              <a:sym typeface="Average"/>
+            <a:endParaRPr sz="3000" b="0" dirty="0">
+              <a:highlight>
+                <a:schemeClr val="lt1"/>
+              </a:highlight>
+              <a:latin typeface="Lato"/>
+              <a:ea typeface="Lato"/>
+              <a:cs typeface="Lato"/>
+              <a:sym typeface="Lato"/>
             </a:endParaRPr>
           </a:p>
           <a:p>
             <a:pPr marL="0" lvl="0" indent="0" algn="l" rtl="0">
               <a:spcBef>
-                <a:spcPts val="1200"/>
+                <a:spcPts val="0"/>
               </a:spcBef>
               <a:spcAft>
                 <a:spcPts val="0"/>
@@ -18743,17 +19002,13 @@
               <a:buSzPts val="990"/>
               <a:buNone/>
             </a:pPr>
-            <a:endParaRPr sz="1440">
-              <a:solidFill>
-                <a:srgbClr val="000000"/>
-              </a:solidFill>
-            </a:endParaRPr>
+            <a:endParaRPr sz="3000" dirty="0"/>
           </a:p>
         </p:txBody>
       </p:sp>
       <p:sp>
         <p:nvSpPr>
-          <p:cNvPr id="343" name="Google Shape;343;p23"/>
+          <p:cNvPr id="337" name="Google Shape;337;p22"/>
           <p:cNvSpPr txBox="1">
             <a:spLocks noGrp="1"/>
           </p:cNvSpPr>
@@ -18763,8 +19018,8 @@
         </p:nvSpPr>
         <p:spPr>
           <a:xfrm>
-            <a:off x="3147850" y="363500"/>
-            <a:ext cx="3191100" cy="695400"/>
+            <a:off x="183625" y="463296"/>
+            <a:ext cx="8902800" cy="4815840"/>
           </a:xfrm>
           <a:prstGeom prst="rect">
             <a:avLst/>
@@ -18772,7 +19027,7 @@
         </p:spPr>
         <p:txBody>
           <a:bodyPr spcFirstLastPara="1" wrap="square" lIns="91425" tIns="91425" rIns="91425" bIns="91425" anchor="t" anchorCtr="0">
-            <a:noAutofit/>
+            <a:normAutofit/>
           </a:bodyPr>
           <a:lstStyle/>
           <a:p>
@@ -18785,25 +19040,52 @@
               </a:spcAft>
               <a:buNone/>
             </a:pPr>
-            <a:r>
-              <a:rPr lang="fr" sz="2400">
-                <a:latin typeface="Average"/>
-                <a:ea typeface="Average"/>
-                <a:cs typeface="Average"/>
-                <a:sym typeface="Average"/>
-              </a:rPr>
-              <a:t>CONCLUSION</a:t>
-            </a:r>
-            <a:endParaRPr sz="2400">
-              <a:latin typeface="Average"/>
-              <a:ea typeface="Average"/>
-              <a:cs typeface="Average"/>
-              <a:sym typeface="Average"/>
+            <a:endParaRPr sz="1605" dirty="0">
+              <a:solidFill>
+                <a:schemeClr val="bg2">
+                  <a:lumMod val="50000"/>
+                </a:schemeClr>
+              </a:solidFill>
             </a:endParaRPr>
           </a:p>
         </p:txBody>
       </p:sp>
+      <p:pic>
+        <p:nvPicPr>
+          <p:cNvPr id="3" name="Picture 2">
+            <a:extLst>
+              <a:ext uri="{FF2B5EF4-FFF2-40B4-BE49-F238E27FC236}">
+                <a16:creationId xmlns:a16="http://schemas.microsoft.com/office/drawing/2014/main" id="{B1E9B385-9A30-3352-E030-78CCF66AB04C}"/>
+              </a:ext>
+            </a:extLst>
+          </p:cNvPr>
+          <p:cNvPicPr>
+            <a:picLocks noChangeAspect="1"/>
+          </p:cNvPicPr>
+          <p:nvPr/>
+        </p:nvPicPr>
+        <p:blipFill>
+          <a:blip r:embed="rId3"/>
+          <a:stretch>
+            <a:fillRect/>
+          </a:stretch>
+        </p:blipFill>
+        <p:spPr>
+          <a:xfrm>
+            <a:off x="183625" y="452785"/>
+            <a:ext cx="7998127" cy="4473453"/>
+          </a:xfrm>
+          <a:prstGeom prst="rect">
+            <a:avLst/>
+          </a:prstGeom>
+        </p:spPr>
+      </p:pic>
     </p:spTree>
+    <p:extLst>
+      <p:ext uri="{BB962C8B-B14F-4D97-AF65-F5344CB8AC3E}">
+        <p14:creationId xmlns:p14="http://schemas.microsoft.com/office/powerpoint/2010/main" val="1220881266"/>
+      </p:ext>
+    </p:extLst>
   </p:cSld>
   <p:clrMapOvr>
     <a:masterClrMapping/>

</xml_diff>